<commit_message>
add slides with maps
</commit_message>
<xml_diff>
--- a/data/hubbard_brook/hubbard_maps.pptx
+++ b/data/hubbard_brook/hubbard_maps.pptx
@@ -10,6 +10,7 @@
     <p:sldId id="257" r:id="rId4"/>
     <p:sldId id="259" r:id="rId5"/>
     <p:sldId id="260" r:id="rId6"/>
+    <p:sldId id="261" r:id="rId7"/>
   </p:sldIdLst>
   <p:sldSz cx="12192000" cy="6858000"/>
   <p:notesSz cx="6858000" cy="9144000"/>
@@ -108,6 +109,11 @@
       </a:defRPr>
     </a:lvl9pPr>
   </p:defaultTextStyle>
+  <p:extLst>
+    <p:ext uri="{EFAFB233-063F-42B5-8137-9DF3F51BA10A}">
+      <p15:sldGuideLst xmlns:p15="http://schemas.microsoft.com/office/powerpoint/2012/main"/>
+    </p:ext>
+  </p:extLst>
 </p:presentation>
 </file>
 
@@ -3807,72 +3813,1227 @@
           <a:bodyPr/>
           <a:lstStyle/>
           <a:p>
-            <a:endParaRPr lang="en-US"/>
-          </a:p>
-        </p:txBody>
-      </p:sp>
-      <p:pic>
-        <p:nvPicPr>
-          <p:cNvPr id="6" name="Picture 5">
-            <a:extLst>
-              <a:ext uri="{FF2B5EF4-FFF2-40B4-BE49-F238E27FC236}">
-                <a16:creationId xmlns:a16="http://schemas.microsoft.com/office/drawing/2014/main" id="{B1CC578E-1770-4FF5-9AF7-D705F941BBE6}"/>
-              </a:ext>
-            </a:extLst>
-          </p:cNvPr>
-          <p:cNvPicPr>
-            <a:picLocks noChangeAspect="1"/>
-          </p:cNvPicPr>
-          <p:nvPr/>
-        </p:nvPicPr>
-        <p:blipFill rotWithShape="1">
-          <a:blip r:embed="rId2"/>
-          <a:srcRect l="34828" t="19770" r="4052" b="13410"/>
-          <a:stretch/>
-        </p:blipFill>
-        <p:spPr>
-          <a:xfrm>
-            <a:off x="4246178" y="1355834"/>
-            <a:ext cx="7451837" cy="4582511"/>
-          </a:xfrm>
-          <a:prstGeom prst="rect">
-            <a:avLst/>
-          </a:prstGeom>
-        </p:spPr>
-      </p:pic>
-      <p:pic>
-        <p:nvPicPr>
-          <p:cNvPr id="4" name="Picture 3">
-            <a:extLst>
-              <a:ext uri="{FF2B5EF4-FFF2-40B4-BE49-F238E27FC236}">
-                <a16:creationId xmlns:a16="http://schemas.microsoft.com/office/drawing/2014/main" id="{143049A8-27B5-40DD-B539-FFB58523935B}"/>
-              </a:ext>
-            </a:extLst>
-          </p:cNvPr>
-          <p:cNvPicPr>
-            <a:picLocks noChangeAspect="1"/>
-          </p:cNvPicPr>
-          <p:nvPr/>
-        </p:nvPicPr>
-        <p:blipFill rotWithShape="1">
-          <a:blip r:embed="rId3"/>
-          <a:srcRect l="34828" t="19770" r="4052" b="13410"/>
-          <a:stretch/>
-        </p:blipFill>
-        <p:spPr>
-          <a:xfrm>
-            <a:off x="4246178" y="1355834"/>
-            <a:ext cx="7451837" cy="4582511"/>
-          </a:xfrm>
-          <a:prstGeom prst="rect">
-            <a:avLst/>
-          </a:prstGeom>
-        </p:spPr>
-      </p:pic>
+            <a:r>
+              <a:rPr lang="en-US" dirty="0"/>
+              <a:t>Goals</a:t>
+            </a:r>
+          </a:p>
+          <a:p>
+            <a:r>
+              <a:rPr lang="en-US" dirty="0"/>
+              <a:t>Compare the performance of classic TOPMODEL and an alternative version that includes soil parameters</a:t>
+            </a:r>
+          </a:p>
+          <a:p>
+            <a:r>
+              <a:rPr lang="en-US" dirty="0"/>
+              <a:t>Extend the comparison analysis across different watersheds and, possibly scales</a:t>
+            </a:r>
+          </a:p>
+          <a:p>
+            <a:r>
+              <a:rPr lang="en-US" dirty="0"/>
+              <a:t>Propose a formulation of saturation excess (improved TOPMODEL), recommend contexts/landscapes where to apply it</a:t>
+            </a:r>
+          </a:p>
+        </p:txBody>
+      </p:sp>
     </p:spTree>
     <p:extLst>
       <p:ext uri="{BB962C8B-B14F-4D97-AF65-F5344CB8AC3E}">
         <p14:creationId xmlns:p14="http://schemas.microsoft.com/office/powerpoint/2010/main" val="355609854"/>
+      </p:ext>
+    </p:extLst>
+  </p:cSld>
+  <p:clrMapOvr>
+    <a:masterClrMapping/>
+  </p:clrMapOvr>
+</p:sld>
+</file>
+
+<file path=ppt/slides/slide6.xml><?xml version="1.0" encoding="utf-8"?>
+<p:sld xmlns:a="http://schemas.openxmlformats.org/drawingml/2006/main" xmlns:r="http://schemas.openxmlformats.org/officeDocument/2006/relationships" xmlns:p="http://schemas.openxmlformats.org/presentationml/2006/main">
+  <p:cSld>
+    <p:spTree>
+      <p:nvGrpSpPr>
+        <p:cNvPr id="1" name=""/>
+        <p:cNvGrpSpPr/>
+        <p:nvPr/>
+      </p:nvGrpSpPr>
+      <p:grpSpPr>
+        <a:xfrm>
+          <a:off x="0" y="0"/>
+          <a:ext cx="0" cy="0"/>
+          <a:chOff x="0" y="0"/>
+          <a:chExt cx="0" cy="0"/>
+        </a:xfrm>
+      </p:grpSpPr>
+      <p:cxnSp>
+        <p:nvCxnSpPr>
+          <p:cNvPr id="5" name="Straight Connector 4">
+            <a:extLst>
+              <a:ext uri="{FF2B5EF4-FFF2-40B4-BE49-F238E27FC236}">
+                <a16:creationId xmlns:a16="http://schemas.microsoft.com/office/drawing/2014/main" id="{AF454A27-6175-4ED9-8DA0-E88ED491CA82}"/>
+              </a:ext>
+            </a:extLst>
+          </p:cNvPr>
+          <p:cNvCxnSpPr/>
+          <p:nvPr/>
+        </p:nvCxnSpPr>
+        <p:spPr>
+          <a:xfrm>
+            <a:off x="1878496" y="2107096"/>
+            <a:ext cx="0" cy="2653747"/>
+          </a:xfrm>
+          <a:prstGeom prst="line">
+            <a:avLst/>
+          </a:prstGeom>
+        </p:spPr>
+        <p:style>
+          <a:lnRef idx="1">
+            <a:schemeClr val="dk1"/>
+          </a:lnRef>
+          <a:fillRef idx="0">
+            <a:schemeClr val="dk1"/>
+          </a:fillRef>
+          <a:effectRef idx="0">
+            <a:schemeClr val="dk1"/>
+          </a:effectRef>
+          <a:fontRef idx="minor">
+            <a:schemeClr val="tx1"/>
+          </a:fontRef>
+        </p:style>
+      </p:cxnSp>
+      <p:cxnSp>
+        <p:nvCxnSpPr>
+          <p:cNvPr id="6" name="Straight Connector 5">
+            <a:extLst>
+              <a:ext uri="{FF2B5EF4-FFF2-40B4-BE49-F238E27FC236}">
+                <a16:creationId xmlns:a16="http://schemas.microsoft.com/office/drawing/2014/main" id="{650CA3EA-A43B-4147-9678-F72685C053C9}"/>
+              </a:ext>
+            </a:extLst>
+          </p:cNvPr>
+          <p:cNvCxnSpPr>
+            <a:cxnSpLocks/>
+          </p:cNvCxnSpPr>
+          <p:nvPr/>
+        </p:nvCxnSpPr>
+        <p:spPr>
+          <a:xfrm>
+            <a:off x="3998844" y="2488096"/>
+            <a:ext cx="0" cy="2642704"/>
+          </a:xfrm>
+          <a:prstGeom prst="line">
+            <a:avLst/>
+          </a:prstGeom>
+        </p:spPr>
+        <p:style>
+          <a:lnRef idx="1">
+            <a:schemeClr val="dk1"/>
+          </a:lnRef>
+          <a:fillRef idx="0">
+            <a:schemeClr val="dk1"/>
+          </a:fillRef>
+          <a:effectRef idx="0">
+            <a:schemeClr val="dk1"/>
+          </a:effectRef>
+          <a:fontRef idx="minor">
+            <a:schemeClr val="tx1"/>
+          </a:fontRef>
+        </p:style>
+      </p:cxnSp>
+      <p:cxnSp>
+        <p:nvCxnSpPr>
+          <p:cNvPr id="9" name="Straight Connector 8">
+            <a:extLst>
+              <a:ext uri="{FF2B5EF4-FFF2-40B4-BE49-F238E27FC236}">
+                <a16:creationId xmlns:a16="http://schemas.microsoft.com/office/drawing/2014/main" id="{AE32E3DE-058B-4469-8A0E-2E5AC0AB49F3}"/>
+              </a:ext>
+            </a:extLst>
+          </p:cNvPr>
+          <p:cNvCxnSpPr>
+            <a:cxnSpLocks/>
+          </p:cNvCxnSpPr>
+          <p:nvPr/>
+        </p:nvCxnSpPr>
+        <p:spPr>
+          <a:xfrm>
+            <a:off x="1878496" y="2107096"/>
+            <a:ext cx="6361044" cy="1143000"/>
+          </a:xfrm>
+          <a:prstGeom prst="line">
+            <a:avLst/>
+          </a:prstGeom>
+        </p:spPr>
+        <p:style>
+          <a:lnRef idx="1">
+            <a:schemeClr val="dk1"/>
+          </a:lnRef>
+          <a:fillRef idx="0">
+            <a:schemeClr val="dk1"/>
+          </a:fillRef>
+          <a:effectRef idx="0">
+            <a:schemeClr val="dk1"/>
+          </a:effectRef>
+          <a:fontRef idx="minor">
+            <a:schemeClr val="tx1"/>
+          </a:fontRef>
+        </p:style>
+      </p:cxnSp>
+      <p:cxnSp>
+        <p:nvCxnSpPr>
+          <p:cNvPr id="11" name="Straight Connector 10">
+            <a:extLst>
+              <a:ext uri="{FF2B5EF4-FFF2-40B4-BE49-F238E27FC236}">
+                <a16:creationId xmlns:a16="http://schemas.microsoft.com/office/drawing/2014/main" id="{4F51021C-806C-4221-9A6F-1D8316579F17}"/>
+              </a:ext>
+            </a:extLst>
+          </p:cNvPr>
+          <p:cNvCxnSpPr>
+            <a:cxnSpLocks/>
+          </p:cNvCxnSpPr>
+          <p:nvPr/>
+        </p:nvCxnSpPr>
+        <p:spPr>
+          <a:xfrm>
+            <a:off x="1878495" y="4760843"/>
+            <a:ext cx="6361045" cy="1131957"/>
+          </a:xfrm>
+          <a:prstGeom prst="line">
+            <a:avLst/>
+          </a:prstGeom>
+        </p:spPr>
+        <p:style>
+          <a:lnRef idx="1">
+            <a:schemeClr val="dk1"/>
+          </a:lnRef>
+          <a:fillRef idx="0">
+            <a:schemeClr val="dk1"/>
+          </a:fillRef>
+          <a:effectRef idx="0">
+            <a:schemeClr val="dk1"/>
+          </a:effectRef>
+          <a:fontRef idx="minor">
+            <a:schemeClr val="tx1"/>
+          </a:fontRef>
+        </p:style>
+      </p:cxnSp>
+      <p:cxnSp>
+        <p:nvCxnSpPr>
+          <p:cNvPr id="17" name="Straight Connector 16">
+            <a:extLst>
+              <a:ext uri="{FF2B5EF4-FFF2-40B4-BE49-F238E27FC236}">
+                <a16:creationId xmlns:a16="http://schemas.microsoft.com/office/drawing/2014/main" id="{DADB7BF2-B46A-49E8-A491-F27AC6F4DDCF}"/>
+              </a:ext>
+            </a:extLst>
+          </p:cNvPr>
+          <p:cNvCxnSpPr>
+            <a:cxnSpLocks/>
+          </p:cNvCxnSpPr>
+          <p:nvPr/>
+        </p:nvCxnSpPr>
+        <p:spPr>
+          <a:xfrm>
+            <a:off x="6119192" y="2869096"/>
+            <a:ext cx="0" cy="2642704"/>
+          </a:xfrm>
+          <a:prstGeom prst="line">
+            <a:avLst/>
+          </a:prstGeom>
+        </p:spPr>
+        <p:style>
+          <a:lnRef idx="1">
+            <a:schemeClr val="dk1"/>
+          </a:lnRef>
+          <a:fillRef idx="0">
+            <a:schemeClr val="dk1"/>
+          </a:fillRef>
+          <a:effectRef idx="0">
+            <a:schemeClr val="dk1"/>
+          </a:effectRef>
+          <a:fontRef idx="minor">
+            <a:schemeClr val="tx1"/>
+          </a:fontRef>
+        </p:style>
+      </p:cxnSp>
+      <p:cxnSp>
+        <p:nvCxnSpPr>
+          <p:cNvPr id="19" name="Straight Connector 18">
+            <a:extLst>
+              <a:ext uri="{FF2B5EF4-FFF2-40B4-BE49-F238E27FC236}">
+                <a16:creationId xmlns:a16="http://schemas.microsoft.com/office/drawing/2014/main" id="{1FCBCC01-F5F0-489C-B7E5-1F192A2CA9B6}"/>
+              </a:ext>
+            </a:extLst>
+          </p:cNvPr>
+          <p:cNvCxnSpPr>
+            <a:cxnSpLocks/>
+          </p:cNvCxnSpPr>
+          <p:nvPr/>
+        </p:nvCxnSpPr>
+        <p:spPr>
+          <a:xfrm>
+            <a:off x="8239540" y="3250096"/>
+            <a:ext cx="0" cy="2642704"/>
+          </a:xfrm>
+          <a:prstGeom prst="line">
+            <a:avLst/>
+          </a:prstGeom>
+        </p:spPr>
+        <p:style>
+          <a:lnRef idx="1">
+            <a:schemeClr val="dk1"/>
+          </a:lnRef>
+          <a:fillRef idx="0">
+            <a:schemeClr val="dk1"/>
+          </a:fillRef>
+          <a:effectRef idx="0">
+            <a:schemeClr val="dk1"/>
+          </a:effectRef>
+          <a:fontRef idx="minor">
+            <a:schemeClr val="tx1"/>
+          </a:fontRef>
+        </p:style>
+      </p:cxnSp>
+      <p:cxnSp>
+        <p:nvCxnSpPr>
+          <p:cNvPr id="23" name="Straight Connector 22">
+            <a:extLst>
+              <a:ext uri="{FF2B5EF4-FFF2-40B4-BE49-F238E27FC236}">
+                <a16:creationId xmlns:a16="http://schemas.microsoft.com/office/drawing/2014/main" id="{CF067682-0B08-44CF-9CFE-40C039ACD7ED}"/>
+              </a:ext>
+            </a:extLst>
+          </p:cNvPr>
+          <p:cNvCxnSpPr>
+            <a:cxnSpLocks/>
+          </p:cNvCxnSpPr>
+          <p:nvPr/>
+        </p:nvCxnSpPr>
+        <p:spPr>
+          <a:xfrm flipV="1">
+            <a:off x="1878495" y="965200"/>
+            <a:ext cx="1821438" cy="1141896"/>
+          </a:xfrm>
+          <a:prstGeom prst="line">
+            <a:avLst/>
+          </a:prstGeom>
+        </p:spPr>
+        <p:style>
+          <a:lnRef idx="1">
+            <a:schemeClr val="dk1"/>
+          </a:lnRef>
+          <a:fillRef idx="0">
+            <a:schemeClr val="dk1"/>
+          </a:fillRef>
+          <a:effectRef idx="0">
+            <a:schemeClr val="dk1"/>
+          </a:effectRef>
+          <a:fontRef idx="minor">
+            <a:schemeClr val="tx1"/>
+          </a:fontRef>
+        </p:style>
+      </p:cxnSp>
+      <p:cxnSp>
+        <p:nvCxnSpPr>
+          <p:cNvPr id="25" name="Straight Connector 24">
+            <a:extLst>
+              <a:ext uri="{FF2B5EF4-FFF2-40B4-BE49-F238E27FC236}">
+                <a16:creationId xmlns:a16="http://schemas.microsoft.com/office/drawing/2014/main" id="{8490D2B9-DDA9-490A-8FD4-44D18FD4BB06}"/>
+              </a:ext>
+            </a:extLst>
+          </p:cNvPr>
+          <p:cNvCxnSpPr>
+            <a:cxnSpLocks/>
+          </p:cNvCxnSpPr>
+          <p:nvPr/>
+        </p:nvCxnSpPr>
+        <p:spPr>
+          <a:xfrm flipV="1">
+            <a:off x="3998843" y="1346200"/>
+            <a:ext cx="1821438" cy="1141896"/>
+          </a:xfrm>
+          <a:prstGeom prst="line">
+            <a:avLst/>
+          </a:prstGeom>
+        </p:spPr>
+        <p:style>
+          <a:lnRef idx="1">
+            <a:schemeClr val="dk1"/>
+          </a:lnRef>
+          <a:fillRef idx="0">
+            <a:schemeClr val="dk1"/>
+          </a:fillRef>
+          <a:effectRef idx="0">
+            <a:schemeClr val="dk1"/>
+          </a:effectRef>
+          <a:fontRef idx="minor">
+            <a:schemeClr val="tx1"/>
+          </a:fontRef>
+        </p:style>
+      </p:cxnSp>
+      <p:cxnSp>
+        <p:nvCxnSpPr>
+          <p:cNvPr id="26" name="Straight Connector 25">
+            <a:extLst>
+              <a:ext uri="{FF2B5EF4-FFF2-40B4-BE49-F238E27FC236}">
+                <a16:creationId xmlns:a16="http://schemas.microsoft.com/office/drawing/2014/main" id="{9C40CFA1-9227-4E22-99AD-49CAC47A8C84}"/>
+              </a:ext>
+            </a:extLst>
+          </p:cNvPr>
+          <p:cNvCxnSpPr>
+            <a:cxnSpLocks/>
+          </p:cNvCxnSpPr>
+          <p:nvPr/>
+        </p:nvCxnSpPr>
+        <p:spPr>
+          <a:xfrm flipV="1">
+            <a:off x="6119192" y="1716157"/>
+            <a:ext cx="1821438" cy="1141896"/>
+          </a:xfrm>
+          <a:prstGeom prst="line">
+            <a:avLst/>
+          </a:prstGeom>
+        </p:spPr>
+        <p:style>
+          <a:lnRef idx="1">
+            <a:schemeClr val="dk1"/>
+          </a:lnRef>
+          <a:fillRef idx="0">
+            <a:schemeClr val="dk1"/>
+          </a:fillRef>
+          <a:effectRef idx="0">
+            <a:schemeClr val="dk1"/>
+          </a:effectRef>
+          <a:fontRef idx="minor">
+            <a:schemeClr val="tx1"/>
+          </a:fontRef>
+        </p:style>
+      </p:cxnSp>
+      <p:cxnSp>
+        <p:nvCxnSpPr>
+          <p:cNvPr id="27" name="Straight Connector 26">
+            <a:extLst>
+              <a:ext uri="{FF2B5EF4-FFF2-40B4-BE49-F238E27FC236}">
+                <a16:creationId xmlns:a16="http://schemas.microsoft.com/office/drawing/2014/main" id="{9A3A2D37-4226-47BD-81B1-D1F710FBF488}"/>
+              </a:ext>
+            </a:extLst>
+          </p:cNvPr>
+          <p:cNvCxnSpPr>
+            <a:cxnSpLocks/>
+          </p:cNvCxnSpPr>
+          <p:nvPr/>
+        </p:nvCxnSpPr>
+        <p:spPr>
+          <a:xfrm flipV="1">
+            <a:off x="8239540" y="2097157"/>
+            <a:ext cx="1821438" cy="1141896"/>
+          </a:xfrm>
+          <a:prstGeom prst="line">
+            <a:avLst/>
+          </a:prstGeom>
+        </p:spPr>
+        <p:style>
+          <a:lnRef idx="1">
+            <a:schemeClr val="dk1"/>
+          </a:lnRef>
+          <a:fillRef idx="0">
+            <a:schemeClr val="dk1"/>
+          </a:fillRef>
+          <a:effectRef idx="0">
+            <a:schemeClr val="dk1"/>
+          </a:effectRef>
+          <a:fontRef idx="minor">
+            <a:schemeClr val="tx1"/>
+          </a:fontRef>
+        </p:style>
+      </p:cxnSp>
+      <p:cxnSp>
+        <p:nvCxnSpPr>
+          <p:cNvPr id="28" name="Straight Connector 27">
+            <a:extLst>
+              <a:ext uri="{FF2B5EF4-FFF2-40B4-BE49-F238E27FC236}">
+                <a16:creationId xmlns:a16="http://schemas.microsoft.com/office/drawing/2014/main" id="{F3006FFA-C195-4A80-9090-83DFD92E6E50}"/>
+              </a:ext>
+            </a:extLst>
+          </p:cNvPr>
+          <p:cNvCxnSpPr>
+            <a:cxnSpLocks/>
+          </p:cNvCxnSpPr>
+          <p:nvPr/>
+        </p:nvCxnSpPr>
+        <p:spPr>
+          <a:xfrm flipV="1">
+            <a:off x="8239540" y="4750904"/>
+            <a:ext cx="1821438" cy="1141896"/>
+          </a:xfrm>
+          <a:prstGeom prst="line">
+            <a:avLst/>
+          </a:prstGeom>
+        </p:spPr>
+        <p:style>
+          <a:lnRef idx="1">
+            <a:schemeClr val="dk1"/>
+          </a:lnRef>
+          <a:fillRef idx="0">
+            <a:schemeClr val="dk1"/>
+          </a:fillRef>
+          <a:effectRef idx="0">
+            <a:schemeClr val="dk1"/>
+          </a:effectRef>
+          <a:fontRef idx="minor">
+            <a:schemeClr val="tx1"/>
+          </a:fontRef>
+        </p:style>
+      </p:cxnSp>
+      <p:cxnSp>
+        <p:nvCxnSpPr>
+          <p:cNvPr id="29" name="Straight Connector 28">
+            <a:extLst>
+              <a:ext uri="{FF2B5EF4-FFF2-40B4-BE49-F238E27FC236}">
+                <a16:creationId xmlns:a16="http://schemas.microsoft.com/office/drawing/2014/main" id="{E8702C54-354E-4847-A517-40BBA10095CA}"/>
+              </a:ext>
+            </a:extLst>
+          </p:cNvPr>
+          <p:cNvCxnSpPr>
+            <a:cxnSpLocks/>
+          </p:cNvCxnSpPr>
+          <p:nvPr/>
+        </p:nvCxnSpPr>
+        <p:spPr>
+          <a:xfrm>
+            <a:off x="10060978" y="2107096"/>
+            <a:ext cx="0" cy="2642704"/>
+          </a:xfrm>
+          <a:prstGeom prst="line">
+            <a:avLst/>
+          </a:prstGeom>
+        </p:spPr>
+        <p:style>
+          <a:lnRef idx="1">
+            <a:schemeClr val="dk1"/>
+          </a:lnRef>
+          <a:fillRef idx="0">
+            <a:schemeClr val="dk1"/>
+          </a:fillRef>
+          <a:effectRef idx="0">
+            <a:schemeClr val="dk1"/>
+          </a:effectRef>
+          <a:fontRef idx="minor">
+            <a:schemeClr val="tx1"/>
+          </a:fontRef>
+        </p:style>
+      </p:cxnSp>
+      <p:cxnSp>
+        <p:nvCxnSpPr>
+          <p:cNvPr id="30" name="Straight Connector 29">
+            <a:extLst>
+              <a:ext uri="{FF2B5EF4-FFF2-40B4-BE49-F238E27FC236}">
+                <a16:creationId xmlns:a16="http://schemas.microsoft.com/office/drawing/2014/main" id="{7390D432-90CA-4A8B-BF0C-83E48BFFB4CB}"/>
+              </a:ext>
+            </a:extLst>
+          </p:cNvPr>
+          <p:cNvCxnSpPr>
+            <a:cxnSpLocks/>
+          </p:cNvCxnSpPr>
+          <p:nvPr/>
+        </p:nvCxnSpPr>
+        <p:spPr>
+          <a:xfrm>
+            <a:off x="3699933" y="964648"/>
+            <a:ext cx="6361044" cy="1143000"/>
+          </a:xfrm>
+          <a:prstGeom prst="line">
+            <a:avLst/>
+          </a:prstGeom>
+        </p:spPr>
+        <p:style>
+          <a:lnRef idx="1">
+            <a:schemeClr val="dk1"/>
+          </a:lnRef>
+          <a:fillRef idx="0">
+            <a:schemeClr val="dk1"/>
+          </a:fillRef>
+          <a:effectRef idx="0">
+            <a:schemeClr val="dk1"/>
+          </a:effectRef>
+          <a:fontRef idx="minor">
+            <a:schemeClr val="tx1"/>
+          </a:fontRef>
+        </p:style>
+      </p:cxnSp>
+      <p:cxnSp>
+        <p:nvCxnSpPr>
+          <p:cNvPr id="32" name="Straight Arrow Connector 31">
+            <a:extLst>
+              <a:ext uri="{FF2B5EF4-FFF2-40B4-BE49-F238E27FC236}">
+                <a16:creationId xmlns:a16="http://schemas.microsoft.com/office/drawing/2014/main" id="{FD5E5FEE-B15C-411F-9264-19BBE4F09B63}"/>
+              </a:ext>
+            </a:extLst>
+          </p:cNvPr>
+          <p:cNvCxnSpPr>
+            <a:cxnSpLocks/>
+          </p:cNvCxnSpPr>
+          <p:nvPr/>
+        </p:nvCxnSpPr>
+        <p:spPr>
+          <a:xfrm>
+            <a:off x="3237582" y="3913622"/>
+            <a:ext cx="1236133" cy="203891"/>
+          </a:xfrm>
+          <a:prstGeom prst="straightConnector1">
+            <a:avLst/>
+          </a:prstGeom>
+          <a:ln>
+            <a:tailEnd type="triangle"/>
+          </a:ln>
+        </p:spPr>
+        <p:style>
+          <a:lnRef idx="1">
+            <a:schemeClr val="dk1"/>
+          </a:lnRef>
+          <a:fillRef idx="0">
+            <a:schemeClr val="dk1"/>
+          </a:fillRef>
+          <a:effectRef idx="0">
+            <a:schemeClr val="dk1"/>
+          </a:effectRef>
+          <a:fontRef idx="minor">
+            <a:schemeClr val="tx1"/>
+          </a:fontRef>
+        </p:style>
+      </p:cxnSp>
+      <p:cxnSp>
+        <p:nvCxnSpPr>
+          <p:cNvPr id="36" name="Straight Arrow Connector 35">
+            <a:extLst>
+              <a:ext uri="{FF2B5EF4-FFF2-40B4-BE49-F238E27FC236}">
+                <a16:creationId xmlns:a16="http://schemas.microsoft.com/office/drawing/2014/main" id="{358C1C9A-976F-4CB6-8D40-B21A449B6220}"/>
+              </a:ext>
+            </a:extLst>
+          </p:cNvPr>
+          <p:cNvCxnSpPr>
+            <a:cxnSpLocks/>
+          </p:cNvCxnSpPr>
+          <p:nvPr/>
+        </p:nvCxnSpPr>
+        <p:spPr>
+          <a:xfrm>
+            <a:off x="5590210" y="4353751"/>
+            <a:ext cx="1236133" cy="203891"/>
+          </a:xfrm>
+          <a:prstGeom prst="straightConnector1">
+            <a:avLst/>
+          </a:prstGeom>
+          <a:ln>
+            <a:tailEnd type="triangle"/>
+          </a:ln>
+        </p:spPr>
+        <p:style>
+          <a:lnRef idx="1">
+            <a:schemeClr val="dk1"/>
+          </a:lnRef>
+          <a:fillRef idx="0">
+            <a:schemeClr val="dk1"/>
+          </a:fillRef>
+          <a:effectRef idx="0">
+            <a:schemeClr val="dk1"/>
+          </a:effectRef>
+          <a:fontRef idx="minor">
+            <a:schemeClr val="tx1"/>
+          </a:fontRef>
+        </p:style>
+      </p:cxnSp>
+      <p:cxnSp>
+        <p:nvCxnSpPr>
+          <p:cNvPr id="37" name="Straight Arrow Connector 36">
+            <a:extLst>
+              <a:ext uri="{FF2B5EF4-FFF2-40B4-BE49-F238E27FC236}">
+                <a16:creationId xmlns:a16="http://schemas.microsoft.com/office/drawing/2014/main" id="{8EA484FE-6400-4741-BA71-18100A33194B}"/>
+              </a:ext>
+            </a:extLst>
+          </p:cNvPr>
+          <p:cNvCxnSpPr>
+            <a:cxnSpLocks/>
+          </p:cNvCxnSpPr>
+          <p:nvPr/>
+        </p:nvCxnSpPr>
+        <p:spPr>
+          <a:xfrm>
+            <a:off x="8723982" y="4828415"/>
+            <a:ext cx="1236133" cy="203891"/>
+          </a:xfrm>
+          <a:prstGeom prst="straightConnector1">
+            <a:avLst/>
+          </a:prstGeom>
+          <a:ln>
+            <a:tailEnd type="triangle"/>
+          </a:ln>
+        </p:spPr>
+        <p:style>
+          <a:lnRef idx="1">
+            <a:schemeClr val="dk1"/>
+          </a:lnRef>
+          <a:fillRef idx="0">
+            <a:schemeClr val="dk1"/>
+          </a:fillRef>
+          <a:effectRef idx="0">
+            <a:schemeClr val="dk1"/>
+          </a:effectRef>
+          <a:fontRef idx="minor">
+            <a:schemeClr val="tx1"/>
+          </a:fontRef>
+        </p:style>
+      </p:cxnSp>
+      <p:sp>
+        <p:nvSpPr>
+          <p:cNvPr id="38" name="TextBox 37">
+            <a:extLst>
+              <a:ext uri="{FF2B5EF4-FFF2-40B4-BE49-F238E27FC236}">
+                <a16:creationId xmlns:a16="http://schemas.microsoft.com/office/drawing/2014/main" id="{2423CA15-807E-414E-98E5-2B733C1D9249}"/>
+              </a:ext>
+            </a:extLst>
+          </p:cNvPr>
+          <p:cNvSpPr txBox="1"/>
+          <p:nvPr/>
+        </p:nvSpPr>
+        <p:spPr>
+          <a:xfrm>
+            <a:off x="3437467" y="1447800"/>
+            <a:ext cx="414866" cy="461665"/>
+          </a:xfrm>
+          <a:prstGeom prst="rect">
+            <a:avLst/>
+          </a:prstGeom>
+          <a:noFill/>
+        </p:spPr>
+        <p:txBody>
+          <a:bodyPr wrap="square" rtlCol="0">
+            <a:spAutoFit/>
+          </a:bodyPr>
+          <a:lstStyle/>
+          <a:p>
+            <a:r>
+              <a:rPr lang="en-US" sz="2400" b="1" dirty="0">
+                <a:solidFill>
+                  <a:srgbClr val="FF0000"/>
+                </a:solidFill>
+              </a:rPr>
+              <a:t>1</a:t>
+            </a:r>
+          </a:p>
+        </p:txBody>
+      </p:sp>
+      <p:sp>
+        <p:nvSpPr>
+          <p:cNvPr id="39" name="TextBox 38">
+            <a:extLst>
+              <a:ext uri="{FF2B5EF4-FFF2-40B4-BE49-F238E27FC236}">
+                <a16:creationId xmlns:a16="http://schemas.microsoft.com/office/drawing/2014/main" id="{CFC5593B-77CB-4644-BBF6-12945E09DD8E}"/>
+              </a:ext>
+            </a:extLst>
+          </p:cNvPr>
+          <p:cNvSpPr txBox="1"/>
+          <p:nvPr/>
+        </p:nvSpPr>
+        <p:spPr>
+          <a:xfrm>
+            <a:off x="5757702" y="1805559"/>
+            <a:ext cx="414866" cy="461665"/>
+          </a:xfrm>
+          <a:prstGeom prst="rect">
+            <a:avLst/>
+          </a:prstGeom>
+          <a:noFill/>
+        </p:spPr>
+        <p:txBody>
+          <a:bodyPr wrap="square" rtlCol="0">
+            <a:spAutoFit/>
+          </a:bodyPr>
+          <a:lstStyle/>
+          <a:p>
+            <a:r>
+              <a:rPr lang="en-US" sz="2400" b="1" dirty="0">
+                <a:solidFill>
+                  <a:srgbClr val="FF0000"/>
+                </a:solidFill>
+              </a:rPr>
+              <a:t>2</a:t>
+            </a:r>
+          </a:p>
+        </p:txBody>
+      </p:sp>
+      <p:sp>
+        <p:nvSpPr>
+          <p:cNvPr id="40" name="TextBox 39">
+            <a:extLst>
+              <a:ext uri="{FF2B5EF4-FFF2-40B4-BE49-F238E27FC236}">
+                <a16:creationId xmlns:a16="http://schemas.microsoft.com/office/drawing/2014/main" id="{403B249B-3C5E-4F4F-AD74-58D171D38812}"/>
+              </a:ext>
+            </a:extLst>
+          </p:cNvPr>
+          <p:cNvSpPr txBox="1"/>
+          <p:nvPr/>
+        </p:nvSpPr>
+        <p:spPr>
+          <a:xfrm>
+            <a:off x="7940627" y="2222819"/>
+            <a:ext cx="414866" cy="461665"/>
+          </a:xfrm>
+          <a:prstGeom prst="rect">
+            <a:avLst/>
+          </a:prstGeom>
+          <a:noFill/>
+        </p:spPr>
+        <p:txBody>
+          <a:bodyPr wrap="square" rtlCol="0">
+            <a:spAutoFit/>
+          </a:bodyPr>
+          <a:lstStyle/>
+          <a:p>
+            <a:r>
+              <a:rPr lang="en-US" sz="2400" b="1" dirty="0">
+                <a:solidFill>
+                  <a:srgbClr val="FF0000"/>
+                </a:solidFill>
+              </a:rPr>
+              <a:t>3</a:t>
+            </a:r>
+          </a:p>
+        </p:txBody>
+      </p:sp>
+      <p:sp>
+        <p:nvSpPr>
+          <p:cNvPr id="41" name="TextBox 40">
+            <a:extLst>
+              <a:ext uri="{FF2B5EF4-FFF2-40B4-BE49-F238E27FC236}">
+                <a16:creationId xmlns:a16="http://schemas.microsoft.com/office/drawing/2014/main" id="{2172E088-5E8C-44A0-949D-6AF0A76E5F19}"/>
+              </a:ext>
+            </a:extLst>
+          </p:cNvPr>
+          <p:cNvSpPr txBox="1"/>
+          <p:nvPr/>
+        </p:nvSpPr>
+        <p:spPr>
+          <a:xfrm>
+            <a:off x="3691654" y="3553902"/>
+            <a:ext cx="828811" cy="461665"/>
+          </a:xfrm>
+          <a:prstGeom prst="rect">
+            <a:avLst/>
+          </a:prstGeom>
+          <a:noFill/>
+        </p:spPr>
+        <p:txBody>
+          <a:bodyPr wrap="square" rtlCol="0">
+            <a:spAutoFit/>
+          </a:bodyPr>
+          <a:lstStyle/>
+          <a:p>
+            <a:r>
+              <a:rPr lang="en-US" sz="2400" dirty="0"/>
+              <a:t>Q</a:t>
+            </a:r>
+            <a:r>
+              <a:rPr lang="en-US" sz="2400" baseline="-25000" dirty="0"/>
+              <a:t>12</a:t>
+            </a:r>
+            <a:endParaRPr lang="en-US" sz="2400" dirty="0"/>
+          </a:p>
+        </p:txBody>
+      </p:sp>
+      <p:sp>
+        <p:nvSpPr>
+          <p:cNvPr id="42" name="TextBox 41">
+            <a:extLst>
+              <a:ext uri="{FF2B5EF4-FFF2-40B4-BE49-F238E27FC236}">
+                <a16:creationId xmlns:a16="http://schemas.microsoft.com/office/drawing/2014/main" id="{241A7D42-46C9-4F4D-905E-B0C74EE36A2F}"/>
+              </a:ext>
+            </a:extLst>
+          </p:cNvPr>
+          <p:cNvSpPr txBox="1"/>
+          <p:nvPr/>
+        </p:nvSpPr>
+        <p:spPr>
+          <a:xfrm>
+            <a:off x="5872466" y="3912022"/>
+            <a:ext cx="828811" cy="461665"/>
+          </a:xfrm>
+          <a:prstGeom prst="rect">
+            <a:avLst/>
+          </a:prstGeom>
+          <a:noFill/>
+        </p:spPr>
+        <p:txBody>
+          <a:bodyPr wrap="square" rtlCol="0">
+            <a:spAutoFit/>
+          </a:bodyPr>
+          <a:lstStyle/>
+          <a:p>
+            <a:r>
+              <a:rPr lang="en-US" sz="2400" dirty="0"/>
+              <a:t>Q</a:t>
+            </a:r>
+            <a:r>
+              <a:rPr lang="en-US" sz="2400" baseline="-25000" dirty="0"/>
+              <a:t>23</a:t>
+            </a:r>
+            <a:endParaRPr lang="en-US" sz="2400" dirty="0"/>
+          </a:p>
+        </p:txBody>
+      </p:sp>
+      <p:sp>
+        <p:nvSpPr>
+          <p:cNvPr id="43" name="TextBox 42">
+            <a:extLst>
+              <a:ext uri="{FF2B5EF4-FFF2-40B4-BE49-F238E27FC236}">
+                <a16:creationId xmlns:a16="http://schemas.microsoft.com/office/drawing/2014/main" id="{C927BBB4-DAC1-41DD-8D29-9F53CC89A140}"/>
+              </a:ext>
+            </a:extLst>
+          </p:cNvPr>
+          <p:cNvSpPr txBox="1"/>
+          <p:nvPr/>
+        </p:nvSpPr>
+        <p:spPr>
+          <a:xfrm>
+            <a:off x="9116215" y="4322393"/>
+            <a:ext cx="828811" cy="461665"/>
+          </a:xfrm>
+          <a:prstGeom prst="rect">
+            <a:avLst/>
+          </a:prstGeom>
+          <a:noFill/>
+        </p:spPr>
+        <p:txBody>
+          <a:bodyPr wrap="square" rtlCol="0">
+            <a:spAutoFit/>
+          </a:bodyPr>
+          <a:lstStyle/>
+          <a:p>
+            <a:r>
+              <a:rPr lang="en-US" sz="2400" dirty="0"/>
+              <a:t>Q</a:t>
+            </a:r>
+            <a:r>
+              <a:rPr lang="en-US" sz="2400" baseline="-25000" dirty="0"/>
+              <a:t>3out</a:t>
+            </a:r>
+            <a:endParaRPr lang="en-US" sz="2400" dirty="0"/>
+          </a:p>
+        </p:txBody>
+      </p:sp>
+      <p:cxnSp>
+        <p:nvCxnSpPr>
+          <p:cNvPr id="45" name="Straight Arrow Connector 44">
+            <a:extLst>
+              <a:ext uri="{FF2B5EF4-FFF2-40B4-BE49-F238E27FC236}">
+                <a16:creationId xmlns:a16="http://schemas.microsoft.com/office/drawing/2014/main" id="{0914D2B1-AADB-4F24-B8E0-7DF25871D7E0}"/>
+              </a:ext>
+            </a:extLst>
+          </p:cNvPr>
+          <p:cNvCxnSpPr/>
+          <p:nvPr/>
+        </p:nvCxnSpPr>
+        <p:spPr>
+          <a:xfrm>
+            <a:off x="1371600" y="2097157"/>
+            <a:ext cx="0" cy="2642704"/>
+          </a:xfrm>
+          <a:prstGeom prst="straightConnector1">
+            <a:avLst/>
+          </a:prstGeom>
+          <a:ln>
+            <a:headEnd type="triangle"/>
+            <a:tailEnd type="triangle"/>
+          </a:ln>
+        </p:spPr>
+        <p:style>
+          <a:lnRef idx="1">
+            <a:schemeClr val="dk1"/>
+          </a:lnRef>
+          <a:fillRef idx="0">
+            <a:schemeClr val="dk1"/>
+          </a:fillRef>
+          <a:effectRef idx="0">
+            <a:schemeClr val="dk1"/>
+          </a:effectRef>
+          <a:fontRef idx="minor">
+            <a:schemeClr val="tx1"/>
+          </a:fontRef>
+        </p:style>
+      </p:cxnSp>
+      <p:sp>
+        <p:nvSpPr>
+          <p:cNvPr id="46" name="TextBox 45">
+            <a:extLst>
+              <a:ext uri="{FF2B5EF4-FFF2-40B4-BE49-F238E27FC236}">
+                <a16:creationId xmlns:a16="http://schemas.microsoft.com/office/drawing/2014/main" id="{FACE5702-CD29-4FF0-87A5-9735CC5D8D0B}"/>
+              </a:ext>
+            </a:extLst>
+          </p:cNvPr>
+          <p:cNvSpPr txBox="1"/>
+          <p:nvPr/>
+        </p:nvSpPr>
+        <p:spPr>
+          <a:xfrm>
+            <a:off x="968422" y="3097049"/>
+            <a:ext cx="377318" cy="461665"/>
+          </a:xfrm>
+          <a:prstGeom prst="rect">
+            <a:avLst/>
+          </a:prstGeom>
+          <a:noFill/>
+        </p:spPr>
+        <p:txBody>
+          <a:bodyPr wrap="square" rtlCol="0">
+            <a:spAutoFit/>
+          </a:bodyPr>
+          <a:lstStyle/>
+          <a:p>
+            <a:r>
+              <a:rPr lang="en-US" sz="2400" dirty="0"/>
+              <a:t>D</a:t>
+            </a:r>
+          </a:p>
+        </p:txBody>
+      </p:sp>
+      <p:cxnSp>
+        <p:nvCxnSpPr>
+          <p:cNvPr id="47" name="Straight Connector 46">
+            <a:extLst>
+              <a:ext uri="{FF2B5EF4-FFF2-40B4-BE49-F238E27FC236}">
+                <a16:creationId xmlns:a16="http://schemas.microsoft.com/office/drawing/2014/main" id="{7B2AB7BB-BA72-4BF0-B253-1F29E3BDBAEA}"/>
+              </a:ext>
+            </a:extLst>
+          </p:cNvPr>
+          <p:cNvCxnSpPr>
+            <a:cxnSpLocks/>
+          </p:cNvCxnSpPr>
+          <p:nvPr/>
+        </p:nvCxnSpPr>
+        <p:spPr>
+          <a:xfrm>
+            <a:off x="1871702" y="2665343"/>
+            <a:ext cx="6361044" cy="1143000"/>
+          </a:xfrm>
+          <a:prstGeom prst="line">
+            <a:avLst/>
+          </a:prstGeom>
+          <a:ln>
+            <a:prstDash val="dash"/>
+          </a:ln>
+        </p:spPr>
+        <p:style>
+          <a:lnRef idx="1">
+            <a:schemeClr val="dk1"/>
+          </a:lnRef>
+          <a:fillRef idx="0">
+            <a:schemeClr val="dk1"/>
+          </a:fillRef>
+          <a:effectRef idx="0">
+            <a:schemeClr val="dk1"/>
+          </a:effectRef>
+          <a:fontRef idx="minor">
+            <a:schemeClr val="tx1"/>
+          </a:fontRef>
+        </p:style>
+      </p:cxnSp>
+      <p:sp>
+        <p:nvSpPr>
+          <p:cNvPr id="48" name="TextBox 47">
+            <a:extLst>
+              <a:ext uri="{FF2B5EF4-FFF2-40B4-BE49-F238E27FC236}">
+                <a16:creationId xmlns:a16="http://schemas.microsoft.com/office/drawing/2014/main" id="{0F724058-499F-4D8C-856C-E0058194CD6F}"/>
+              </a:ext>
+            </a:extLst>
+          </p:cNvPr>
+          <p:cNvSpPr txBox="1"/>
+          <p:nvPr/>
+        </p:nvSpPr>
+        <p:spPr>
+          <a:xfrm rot="600000">
+            <a:off x="2186809" y="2854914"/>
+            <a:ext cx="5229162" cy="369332"/>
+          </a:xfrm>
+          <a:prstGeom prst="rect">
+            <a:avLst/>
+          </a:prstGeom>
+          <a:noFill/>
+        </p:spPr>
+        <p:txBody>
+          <a:bodyPr wrap="square" rtlCol="0">
+            <a:spAutoFit/>
+          </a:bodyPr>
+          <a:lstStyle/>
+          <a:p>
+            <a:r>
+              <a:rPr lang="en-US" dirty="0"/>
+              <a:t>Groundwater table (same slope as ground surface)</a:t>
+            </a:r>
+          </a:p>
+        </p:txBody>
+      </p:sp>
+      <p:cxnSp>
+        <p:nvCxnSpPr>
+          <p:cNvPr id="49" name="Straight Connector 48">
+            <a:extLst>
+              <a:ext uri="{FF2B5EF4-FFF2-40B4-BE49-F238E27FC236}">
+                <a16:creationId xmlns:a16="http://schemas.microsoft.com/office/drawing/2014/main" id="{8242FE06-6E9D-4041-A864-16EA003D2CF2}"/>
+              </a:ext>
+            </a:extLst>
+          </p:cNvPr>
+          <p:cNvCxnSpPr>
+            <a:cxnSpLocks/>
+          </p:cNvCxnSpPr>
+          <p:nvPr/>
+        </p:nvCxnSpPr>
+        <p:spPr>
+          <a:xfrm flipV="1">
+            <a:off x="1885291" y="2212375"/>
+            <a:ext cx="583481" cy="445285"/>
+          </a:xfrm>
+          <a:prstGeom prst="line">
+            <a:avLst/>
+          </a:prstGeom>
+          <a:ln>
+            <a:prstDash val="dash"/>
+          </a:ln>
+        </p:spPr>
+        <p:style>
+          <a:lnRef idx="1">
+            <a:schemeClr val="dk1"/>
+          </a:lnRef>
+          <a:fillRef idx="0">
+            <a:schemeClr val="dk1"/>
+          </a:fillRef>
+          <a:effectRef idx="0">
+            <a:schemeClr val="dk1"/>
+          </a:effectRef>
+          <a:fontRef idx="minor">
+            <a:schemeClr val="tx1"/>
+          </a:fontRef>
+        </p:style>
+      </p:cxnSp>
+      <p:cxnSp>
+        <p:nvCxnSpPr>
+          <p:cNvPr id="50" name="Straight Connector 49">
+            <a:extLst>
+              <a:ext uri="{FF2B5EF4-FFF2-40B4-BE49-F238E27FC236}">
+                <a16:creationId xmlns:a16="http://schemas.microsoft.com/office/drawing/2014/main" id="{AC2C0CDB-C0D9-4FBC-A525-9C99FCB114FD}"/>
+              </a:ext>
+            </a:extLst>
+          </p:cNvPr>
+          <p:cNvCxnSpPr>
+            <a:cxnSpLocks/>
+          </p:cNvCxnSpPr>
+          <p:nvPr/>
+        </p:nvCxnSpPr>
+        <p:spPr>
+          <a:xfrm flipV="1">
+            <a:off x="8246336" y="2647721"/>
+            <a:ext cx="1821438" cy="1141896"/>
+          </a:xfrm>
+          <a:prstGeom prst="line">
+            <a:avLst/>
+          </a:prstGeom>
+          <a:ln>
+            <a:prstDash val="dash"/>
+          </a:ln>
+        </p:spPr>
+        <p:style>
+          <a:lnRef idx="1">
+            <a:schemeClr val="dk1"/>
+          </a:lnRef>
+          <a:fillRef idx="0">
+            <a:schemeClr val="dk1"/>
+          </a:fillRef>
+          <a:effectRef idx="0">
+            <a:schemeClr val="dk1"/>
+          </a:effectRef>
+          <a:fontRef idx="minor">
+            <a:schemeClr val="tx1"/>
+          </a:fontRef>
+        </p:style>
+      </p:cxnSp>
+      <p:cxnSp>
+        <p:nvCxnSpPr>
+          <p:cNvPr id="52" name="Straight Arrow Connector 51">
+            <a:extLst>
+              <a:ext uri="{FF2B5EF4-FFF2-40B4-BE49-F238E27FC236}">
+                <a16:creationId xmlns:a16="http://schemas.microsoft.com/office/drawing/2014/main" id="{3EB3BEEF-C8B0-4FB1-8C33-310E71DB3686}"/>
+              </a:ext>
+            </a:extLst>
+          </p:cNvPr>
+          <p:cNvCxnSpPr>
+            <a:cxnSpLocks/>
+          </p:cNvCxnSpPr>
+          <p:nvPr/>
+        </p:nvCxnSpPr>
+        <p:spPr>
+          <a:xfrm>
+            <a:off x="2403470" y="2770908"/>
+            <a:ext cx="0" cy="2070306"/>
+          </a:xfrm>
+          <a:prstGeom prst="straightConnector1">
+            <a:avLst/>
+          </a:prstGeom>
+          <a:ln>
+            <a:headEnd type="triangle"/>
+            <a:tailEnd type="triangle"/>
+          </a:ln>
+        </p:spPr>
+        <p:style>
+          <a:lnRef idx="1">
+            <a:schemeClr val="dk1"/>
+          </a:lnRef>
+          <a:fillRef idx="0">
+            <a:schemeClr val="dk1"/>
+          </a:fillRef>
+          <a:effectRef idx="0">
+            <a:schemeClr val="dk1"/>
+          </a:effectRef>
+          <a:fontRef idx="minor">
+            <a:schemeClr val="tx1"/>
+          </a:fontRef>
+        </p:style>
+      </p:cxnSp>
+      <p:sp>
+        <p:nvSpPr>
+          <p:cNvPr id="53" name="TextBox 52">
+            <a:extLst>
+              <a:ext uri="{FF2B5EF4-FFF2-40B4-BE49-F238E27FC236}">
+                <a16:creationId xmlns:a16="http://schemas.microsoft.com/office/drawing/2014/main" id="{2AA879EF-61E5-47F5-AB8D-A7BB532BEFE1}"/>
+              </a:ext>
+            </a:extLst>
+          </p:cNvPr>
+          <p:cNvSpPr txBox="1"/>
+          <p:nvPr/>
+        </p:nvSpPr>
+        <p:spPr>
+          <a:xfrm>
+            <a:off x="2000292" y="3770800"/>
+            <a:ext cx="377318" cy="461665"/>
+          </a:xfrm>
+          <a:prstGeom prst="rect">
+            <a:avLst/>
+          </a:prstGeom>
+          <a:noFill/>
+        </p:spPr>
+        <p:txBody>
+          <a:bodyPr wrap="square" rtlCol="0">
+            <a:spAutoFit/>
+          </a:bodyPr>
+          <a:lstStyle/>
+          <a:p>
+            <a:r>
+              <a:rPr lang="en-US" sz="2400" dirty="0"/>
+              <a:t>d</a:t>
+            </a:r>
+          </a:p>
+        </p:txBody>
+      </p:sp>
+    </p:spTree>
+    <p:extLst>
+      <p:ext uri="{BB962C8B-B14F-4D97-AF65-F5344CB8AC3E}">
+        <p14:creationId xmlns:p14="http://schemas.microsoft.com/office/powerpoint/2010/main" val="709762401"/>
       </p:ext>
     </p:extLst>
   </p:cSld>

</xml_diff>